<commit_message>
Fix typos, add pdf for demo
</commit_message>
<xml_diff>
--- a/port_versions/ping-pong-demo.pptx
+++ b/port_versions/ping-pong-demo.pptx
@@ -268,7 +268,7 @@
           <a:p>
             <a:fld id="{430E6126-3021-42AB-82F0-0A73F9DC5566}" type="datetimeFigureOut">
               <a:rPr lang="hu-HU" smtClean="0"/>
-              <a:t>2018. 01. 15.</a:t>
+              <a:t>2018.01.16.</a:t>
             </a:fld>
             <a:endParaRPr lang="hu-HU"/>
           </a:p>
@@ -466,7 +466,7 @@
           <a:p>
             <a:fld id="{430E6126-3021-42AB-82F0-0A73F9DC5566}" type="datetimeFigureOut">
               <a:rPr lang="hu-HU" smtClean="0"/>
-              <a:t>2018. 01. 15.</a:t>
+              <a:t>2018.01.16.</a:t>
             </a:fld>
             <a:endParaRPr lang="hu-HU"/>
           </a:p>
@@ -674,7 +674,7 @@
           <a:p>
             <a:fld id="{430E6126-3021-42AB-82F0-0A73F9DC5566}" type="datetimeFigureOut">
               <a:rPr lang="hu-HU" smtClean="0"/>
-              <a:t>2018. 01. 15.</a:t>
+              <a:t>2018.01.16.</a:t>
             </a:fld>
             <a:endParaRPr lang="hu-HU"/>
           </a:p>
@@ -872,7 +872,7 @@
           <a:p>
             <a:fld id="{430E6126-3021-42AB-82F0-0A73F9DC5566}" type="datetimeFigureOut">
               <a:rPr lang="hu-HU" smtClean="0"/>
-              <a:t>2018. 01. 15.</a:t>
+              <a:t>2018.01.16.</a:t>
             </a:fld>
             <a:endParaRPr lang="hu-HU"/>
           </a:p>
@@ -1147,7 +1147,7 @@
           <a:p>
             <a:fld id="{430E6126-3021-42AB-82F0-0A73F9DC5566}" type="datetimeFigureOut">
               <a:rPr lang="hu-HU" smtClean="0"/>
-              <a:t>2018. 01. 15.</a:t>
+              <a:t>2018.01.16.</a:t>
             </a:fld>
             <a:endParaRPr lang="hu-HU"/>
           </a:p>
@@ -1412,7 +1412,7 @@
           <a:p>
             <a:fld id="{430E6126-3021-42AB-82F0-0A73F9DC5566}" type="datetimeFigureOut">
               <a:rPr lang="hu-HU" smtClean="0"/>
-              <a:t>2018. 01. 15.</a:t>
+              <a:t>2018.01.16.</a:t>
             </a:fld>
             <a:endParaRPr lang="hu-HU"/>
           </a:p>
@@ -1824,7 +1824,7 @@
           <a:p>
             <a:fld id="{430E6126-3021-42AB-82F0-0A73F9DC5566}" type="datetimeFigureOut">
               <a:rPr lang="hu-HU" smtClean="0"/>
-              <a:t>2018. 01. 15.</a:t>
+              <a:t>2018.01.16.</a:t>
             </a:fld>
             <a:endParaRPr lang="hu-HU"/>
           </a:p>
@@ -1965,7 +1965,7 @@
           <a:p>
             <a:fld id="{430E6126-3021-42AB-82F0-0A73F9DC5566}" type="datetimeFigureOut">
               <a:rPr lang="hu-HU" smtClean="0"/>
-              <a:t>2018. 01. 15.</a:t>
+              <a:t>2018.01.16.</a:t>
             </a:fld>
             <a:endParaRPr lang="hu-HU"/>
           </a:p>
@@ -2078,7 +2078,7 @@
           <a:p>
             <a:fld id="{430E6126-3021-42AB-82F0-0A73F9DC5566}" type="datetimeFigureOut">
               <a:rPr lang="hu-HU" smtClean="0"/>
-              <a:t>2018. 01. 15.</a:t>
+              <a:t>2018.01.16.</a:t>
             </a:fld>
             <a:endParaRPr lang="hu-HU"/>
           </a:p>
@@ -2389,7 +2389,7 @@
           <a:p>
             <a:fld id="{430E6126-3021-42AB-82F0-0A73F9DC5566}" type="datetimeFigureOut">
               <a:rPr lang="hu-HU" smtClean="0"/>
-              <a:t>2018. 01. 15.</a:t>
+              <a:t>2018.01.16.</a:t>
             </a:fld>
             <a:endParaRPr lang="hu-HU"/>
           </a:p>
@@ -2677,7 +2677,7 @@
           <a:p>
             <a:fld id="{430E6126-3021-42AB-82F0-0A73F9DC5566}" type="datetimeFigureOut">
               <a:rPr lang="hu-HU" smtClean="0"/>
-              <a:t>2018. 01. 15.</a:t>
+              <a:t>2018.01.16.</a:t>
             </a:fld>
             <a:endParaRPr lang="hu-HU"/>
           </a:p>
@@ -2918,7 +2918,7 @@
           <a:p>
             <a:fld id="{430E6126-3021-42AB-82F0-0A73F9DC5566}" type="datetimeFigureOut">
               <a:rPr lang="hu-HU" smtClean="0"/>
-              <a:t>2018. 01. 15.</a:t>
+              <a:t>2018.01.16.</a:t>
             </a:fld>
             <a:endParaRPr lang="hu-HU"/>
           </a:p>
@@ -4656,31 +4656,15 @@
           <a:p>
             <a:r>
               <a:rPr lang="hu-HU" dirty="0"/>
-              <a:t>A </a:t>
-            </a:r>
-            <a:r>
-              <a:rPr lang="hu-HU" dirty="0" err="1"/>
-              <a:t>connectorokhoz</a:t>
-            </a:r>
-            <a:r>
-              <a:rPr lang="hu-HU" dirty="0"/>
-              <a:t> asszociációkat generálunk, mellyel fel tudjuk </a:t>
-            </a:r>
-            <a:r>
-              <a:rPr lang="hu-HU" dirty="0" err="1"/>
-              <a:t>típusozni</a:t>
-            </a:r>
-            <a:r>
-              <a:rPr lang="hu-HU" dirty="0"/>
-              <a:t> az adott </a:t>
-            </a:r>
-            <a:r>
-              <a:rPr lang="hu-HU" dirty="0" err="1"/>
-              <a:t>connectort</a:t>
-            </a:r>
-            <a:r>
-              <a:rPr lang="hu-HU" dirty="0"/>
-              <a:t>.</a:t>
+              <a:t>A connectorokhoz asszociációkat generálunk, mellyel fel tudjuk </a:t>
+            </a:r>
+            <a:r>
+              <a:rPr lang="hu-HU" dirty="0" smtClean="0"/>
+              <a:t>tipusozni </a:t>
+            </a:r>
+            <a:r>
+              <a:rPr lang="hu-HU" dirty="0"/>
+              <a:t>az adott connectort.</a:t>
             </a:r>
           </a:p>
           <a:p>
@@ -4915,58 +4899,30 @@
           </a:p>
           <a:p>
             <a:r>
-              <a:rPr lang="hu-HU" dirty="0" err="1"/>
-              <a:t>Delegate</a:t>
-            </a:r>
-            <a:r>
-              <a:rPr lang="hu-HU" dirty="0"/>
-              <a:t> </a:t>
-            </a:r>
-            <a:r>
-              <a:rPr lang="hu-HU" dirty="0" err="1"/>
-              <a:t>connect</a:t>
-            </a:r>
-            <a:r>
-              <a:rPr lang="hu-HU" dirty="0"/>
-              <a:t> esetén azonos típusú interfészeket kötök össze, így itt további </a:t>
-            </a:r>
-            <a:r>
-              <a:rPr lang="hu-HU" dirty="0" err="1"/>
-              <a:t>trükközésre</a:t>
-            </a:r>
-            <a:r>
-              <a:rPr lang="hu-HU" dirty="0"/>
-              <a:t> van szükség, hogy kinyerjem a szolgáltatott interfészt.</a:t>
-            </a:r>
-          </a:p>
-          <a:p>
-            <a:r>
-              <a:rPr lang="hu-HU" dirty="0"/>
-              <a:t>A végpontokat csak a </a:t>
-            </a:r>
-            <a:r>
-              <a:rPr lang="hu-HU" dirty="0" err="1"/>
-              <a:t>required-provided</a:t>
-            </a:r>
-            <a:r>
-              <a:rPr lang="hu-HU" dirty="0"/>
-              <a:t> típushelyesség ellenőrzésére használom fel, ami kódgenerálás esetén </a:t>
-            </a:r>
-            <a:r>
-              <a:rPr lang="hu-HU" dirty="0" err="1"/>
-              <a:t>elegednő</a:t>
-            </a:r>
-            <a:r>
-              <a:rPr lang="hu-HU" dirty="0"/>
-              <a:t> (mivel ott feltesszük, hogy a modell helyes), de felhasználó által írt kódnál nem feltétlenül, könnyű </a:t>
-            </a:r>
-            <a:r>
-              <a:rPr lang="hu-HU" dirty="0" err="1"/>
-              <a:t>megheckelni</a:t>
-            </a:r>
-            <a:r>
-              <a:rPr lang="hu-HU" dirty="0"/>
-              <a:t>. (Ezért is kéne a kapcsolatokat egységesen kezelni, de ez egy nagyobb munka lenne..)</a:t>
+              <a:rPr lang="hu-HU" dirty="0"/>
+              <a:t>Delegate connect esetén azonos típusú interfészeket kötök össze, így itt további </a:t>
+            </a:r>
+            <a:r>
+              <a:rPr lang="hu-HU" dirty="0" smtClean="0"/>
+              <a:t>trükközésre </a:t>
+            </a:r>
+            <a:r>
+              <a:rPr lang="hu-HU" dirty="0"/>
+              <a:t>van szükség, hogy kinyerjem a szolgáltatott interfészt.</a:t>
+            </a:r>
+          </a:p>
+          <a:p>
+            <a:r>
+              <a:rPr lang="hu-HU" dirty="0"/>
+              <a:t>A végpontokat csak a required-provided típushelyesség ellenőrzésére használom fel, ami kódgenerálás esetén </a:t>
+            </a:r>
+            <a:r>
+              <a:rPr lang="hu-HU" dirty="0" smtClean="0"/>
+              <a:t>elegendő </a:t>
+            </a:r>
+            <a:r>
+              <a:rPr lang="hu-HU" dirty="0"/>
+              <a:t>(mivel ott feltesszük, hogy a modell helyes), de felhasználó által írt kódnál nem feltétlenül, könnyű megheckelni. (Ezért is kéne a kapcsolatokat egységesen kezelni, de ez egy nagyobb munka lenne..)</a:t>
             </a:r>
           </a:p>
         </p:txBody>
@@ -5259,12 +5215,40 @@
               <a:t>Generált kódban már fel van </a:t>
             </a:r>
             <a:r>
+              <a:rPr lang="hu-HU" dirty="0" smtClean="0"/>
+              <a:t>tipusozva </a:t>
+            </a:r>
+            <a:r>
+              <a:rPr lang="hu-HU" dirty="0"/>
+              <a:t>az adott port a required interfésszel, így  a send gond nélkül megvalósítható.</a:t>
+            </a:r>
+          </a:p>
+          <a:p>
+            <a:r>
+              <a:rPr lang="hu-HU" dirty="0"/>
+              <a:t>A </a:t>
+            </a:r>
+            <a:r>
               <a:rPr lang="hu-HU" dirty="0" err="1"/>
-              <a:t>típusozva</a:t>
-            </a:r>
-            <a:r>
-              <a:rPr lang="hu-HU" dirty="0"/>
-              <a:t> az adott port a </a:t>
+              <a:t>send</a:t>
+            </a:r>
+            <a:r>
+              <a:rPr lang="hu-HU" dirty="0"/>
+              <a:t> implementáció függő, máshogy viselkedik </a:t>
+            </a:r>
+            <a:r>
+              <a:rPr lang="hu-HU" dirty="0" err="1"/>
+              <a:t>behavior</a:t>
+            </a:r>
+            <a:r>
+              <a:rPr lang="hu-HU" dirty="0"/>
+              <a:t> port és sima port esetén.</a:t>
+            </a:r>
+          </a:p>
+          <a:p>
+            <a:r>
+              <a:rPr lang="hu-HU" dirty="0"/>
+              <a:t>A típushelyességet az biztosítja, hogy minden interfész </a:t>
             </a:r>
             <a:r>
               <a:rPr lang="hu-HU" dirty="0" err="1"/>
@@ -5272,7 +5256,7 @@
             </a:r>
             <a:r>
               <a:rPr lang="hu-HU" dirty="0"/>
-              <a:t> interfésszel, így  a </a:t>
+              <a:t> partjához annyi </a:t>
             </a:r>
             <a:r>
               <a:rPr lang="hu-HU" dirty="0" err="1"/>
@@ -5280,71 +5264,14 @@
             </a:r>
             <a:r>
               <a:rPr lang="hu-HU" dirty="0"/>
-              <a:t> gond nélkül megvalósítható.</a:t>
-            </a:r>
-          </a:p>
-          <a:p>
-            <a:r>
-              <a:rPr lang="hu-HU" dirty="0"/>
-              <a:t>A </a:t>
-            </a:r>
-            <a:r>
-              <a:rPr lang="hu-HU" dirty="0" err="1"/>
-              <a:t>send</a:t>
-            </a:r>
-            <a:r>
-              <a:rPr lang="hu-HU" dirty="0"/>
-              <a:t> implementáció függő, máshogy viselkedik </a:t>
-            </a:r>
-            <a:r>
-              <a:rPr lang="hu-HU" dirty="0" err="1"/>
-              <a:t>behavior</a:t>
-            </a:r>
-            <a:r>
-              <a:rPr lang="hu-HU" dirty="0"/>
-              <a:t> port és sima port esetén.</a:t>
-            </a:r>
-          </a:p>
-          <a:p>
-            <a:r>
-              <a:rPr lang="hu-HU" dirty="0"/>
-              <a:t>A típushelyességet az biztosítja, hogy minden interfész </a:t>
-            </a:r>
-            <a:r>
-              <a:rPr lang="hu-HU" dirty="0" err="1"/>
-              <a:t>required</a:t>
-            </a:r>
-            <a:r>
-              <a:rPr lang="hu-HU" dirty="0"/>
-              <a:t> partjához annyi </a:t>
-            </a:r>
-            <a:r>
-              <a:rPr lang="hu-HU" dirty="0" err="1"/>
-              <a:t>send</a:t>
-            </a:r>
-            <a:r>
-              <a:rPr lang="hu-HU" dirty="0"/>
               <a:t> műveletet generálunk, ahány receptiönje van, túlterheljük a különböző típusú szignálokkal.</a:t>
             </a:r>
           </a:p>
           <a:p>
             <a:r>
               <a:rPr lang="hu-HU" dirty="0"/>
-              <a:t>Annak idején ez tűnt a legelegánsabb megoldásoknak, de lehetne az UML reprezentációhoz közelebbi megoldást is kitalálni (in </a:t>
-            </a:r>
-            <a:r>
-              <a:rPr lang="hu-HU" dirty="0" err="1"/>
-              <a:t>progress</a:t>
-            </a:r>
-            <a:r>
-              <a:rPr lang="hu-HU" dirty="0"/>
-              <a:t>, ahogy lesz </a:t>
-            </a:r>
-            <a:r>
-              <a:rPr lang="hu-HU"/>
-              <a:t>rá idő..)</a:t>
-            </a:r>
-            <a:endParaRPr lang="hu-HU" dirty="0"/>
+              <a:t>Annak idején ez tűnt a legelegánsabb megoldásoknak, de lehetne az UML reprezentációhoz közelebbi megoldást is kitalálni (in progress, ahogy lesz rá idő..)</a:t>
+            </a:r>
           </a:p>
         </p:txBody>
       </p:sp>

</xml_diff>